<commit_message>
Created the desing for presentation
</commit_message>
<xml_diff>
--- a/002_Cognizant_Artificial_Intelligence/2_Data_Modelling/data_modelling_communication.pptx
+++ b/002_Cognizant_Artificial_Intelligence/2_Data_Modelling/data_modelling_communication.pptx
@@ -104,6 +104,11 @@
       </a:defRPr>
     </a:lvl9pPr>
   </p:defaultTextStyle>
+  <p:extLst>
+    <p:ext uri="{EFAFB233-063F-42B5-8137-9DF3F51BA10A}">
+      <p15:sldGuideLst xmlns:p15="http://schemas.microsoft.com/office/powerpoint/2012/main"/>
+    </p:ext>
+  </p:extLst>
 </p:presentation>
 </file>
 
@@ -3342,6 +3347,126 @@
           <a:chExt cx="0" cy="0"/>
         </a:xfrm>
       </p:grpSpPr>
+      <p:sp>
+        <p:nvSpPr>
+          <p:cNvPr id="2" name="Flowchart: Off-page Connector 1">
+            <a:extLst>
+              <a:ext uri="{FF2B5EF4-FFF2-40B4-BE49-F238E27FC236}">
+                <a16:creationId xmlns:a16="http://schemas.microsoft.com/office/drawing/2014/main" id="{340C74DD-080F-AE8D-B3AA-B3127EC730C9}"/>
+              </a:ext>
+            </a:extLst>
+          </p:cNvPr>
+          <p:cNvSpPr/>
+          <p:nvPr/>
+        </p:nvSpPr>
+        <p:spPr>
+          <a:xfrm rot="16200000">
+            <a:off x="-844420" y="844422"/>
+            <a:ext cx="6857998" cy="5169158"/>
+          </a:xfrm>
+          <a:prstGeom prst="flowChartOffpageConnector">
+            <a:avLst/>
+          </a:prstGeom>
+        </p:spPr>
+        <p:style>
+          <a:lnRef idx="2">
+            <a:schemeClr val="accent1">
+              <a:shade val="50000"/>
+            </a:schemeClr>
+          </a:lnRef>
+          <a:fillRef idx="1">
+            <a:schemeClr val="accent1"/>
+          </a:fillRef>
+          <a:effectRef idx="0">
+            <a:schemeClr val="accent1"/>
+          </a:effectRef>
+          <a:fontRef idx="minor">
+            <a:schemeClr val="lt1"/>
+          </a:fontRef>
+        </p:style>
+        <p:txBody>
+          <a:bodyPr rtlCol="0" anchor="ctr"/>
+          <a:lstStyle/>
+          <a:p>
+            <a:pPr algn="ctr"/>
+            <a:endParaRPr lang="en-NG" dirty="0"/>
+          </a:p>
+        </p:txBody>
+      </p:sp>
+      <p:sp>
+        <p:nvSpPr>
+          <p:cNvPr id="5" name="TextBox 4">
+            <a:extLst>
+              <a:ext uri="{FF2B5EF4-FFF2-40B4-BE49-F238E27FC236}">
+                <a16:creationId xmlns:a16="http://schemas.microsoft.com/office/drawing/2014/main" id="{9B812621-DA9C-AC3C-440E-84F20C1ABF64}"/>
+              </a:ext>
+            </a:extLst>
+          </p:cNvPr>
+          <p:cNvSpPr txBox="1"/>
+          <p:nvPr/>
+        </p:nvSpPr>
+        <p:spPr>
+          <a:xfrm>
+            <a:off x="816427" y="2397948"/>
+            <a:ext cx="2514601" cy="2062103"/>
+          </a:xfrm>
+          <a:prstGeom prst="rect">
+            <a:avLst/>
+          </a:prstGeom>
+          <a:noFill/>
+        </p:spPr>
+        <p:txBody>
+          <a:bodyPr wrap="square" rtlCol="0" anchor="ctr">
+            <a:spAutoFit/>
+          </a:bodyPr>
+          <a:lstStyle/>
+          <a:p>
+            <a:r>
+              <a:rPr lang="en-US" sz="3200" dirty="0">
+                <a:solidFill>
+                  <a:schemeClr val="bg1"/>
+                </a:solidFill>
+              </a:rPr>
+              <a:t>Executive </a:t>
+            </a:r>
+          </a:p>
+          <a:p>
+            <a:r>
+              <a:rPr lang="en-US" sz="3200" dirty="0">
+                <a:solidFill>
+                  <a:schemeClr val="bg1"/>
+                </a:solidFill>
+              </a:rPr>
+              <a:t>Summary</a:t>
+            </a:r>
+          </a:p>
+          <a:p>
+            <a:r>
+              <a:rPr lang="en-US" sz="3200" dirty="0">
+                <a:solidFill>
+                  <a:schemeClr val="bg1"/>
+                </a:solidFill>
+              </a:rPr>
+              <a:t>Data</a:t>
+            </a:r>
+          </a:p>
+          <a:p>
+            <a:r>
+              <a:rPr lang="en-US" sz="3200" dirty="0">
+                <a:solidFill>
+                  <a:schemeClr val="bg1"/>
+                </a:solidFill>
+              </a:rPr>
+              <a:t>Modelling</a:t>
+            </a:r>
+            <a:endParaRPr lang="en-NG" sz="3200" dirty="0">
+              <a:solidFill>
+                <a:schemeClr val="bg1"/>
+              </a:solidFill>
+            </a:endParaRPr>
+          </a:p>
+        </p:txBody>
+      </p:sp>
     </p:spTree>
     <p:extLst>
       <p:ext uri="{BB962C8B-B14F-4D97-AF65-F5344CB8AC3E}">

</xml_diff>

<commit_message>
Slide of dat modelling completed
</commit_message>
<xml_diff>
--- a/002_Cognizant_Artificial_Intelligence/2_Data_Modelling/data_modelling_communication.pptx
+++ b/002_Cognizant_Artificial_Intelligence/2_Data_Modelling/data_modelling_communication.pptx
@@ -3482,7 +3482,7 @@
         <p:spPr>
           <a:xfrm>
             <a:off x="6096000" y="870653"/>
-            <a:ext cx="4475584" cy="707886"/>
+            <a:ext cx="4475584" cy="1015663"/>
           </a:xfrm>
           <a:prstGeom prst="rect">
             <a:avLst/>
@@ -3502,12 +3502,16 @@
           </a:p>
           <a:p>
             <a:pPr marL="171450" indent="-171450">
+              <a:buClr>
+                <a:schemeClr val="accent1"/>
+              </a:buClr>
+              <a:buSzPct val="130000"/>
               <a:buFont typeface="Arial" panose="020B0604020202020204" pitchFamily="34" charset="0"/>
               <a:buChar char="•"/>
             </a:pPr>
             <a:r>
               <a:rPr lang="en-US" sz="2000" dirty="0"/>
-              <a:t>Predict the stock levels of products</a:t>
+              <a:t>Can we accurately predict the stock levels of products?</a:t>
             </a:r>
           </a:p>
         </p:txBody>
@@ -3547,6 +3551,10 @@
           </a:p>
           <a:p>
             <a:pPr marL="171450" indent="-171450">
+              <a:buClr>
+                <a:schemeClr val="accent1"/>
+              </a:buClr>
+              <a:buSzPct val="130000"/>
               <a:buFont typeface="Arial" panose="020B0604020202020204" pitchFamily="34" charset="0"/>
               <a:buChar char="•"/>
             </a:pPr>
@@ -3557,6 +3565,10 @@
           </a:p>
           <a:p>
             <a:pPr marL="171450" indent="-171450">
+              <a:buClr>
+                <a:schemeClr val="accent1"/>
+              </a:buClr>
+              <a:buSzPct val="130000"/>
               <a:buFont typeface="Arial" panose="020B0604020202020204" pitchFamily="34" charset="0"/>
               <a:buChar char="•"/>
             </a:pPr>
@@ -3567,6 +3579,10 @@
           </a:p>
           <a:p>
             <a:pPr marL="171450" indent="-171450">
+              <a:buClr>
+                <a:schemeClr val="accent1"/>
+              </a:buClr>
+              <a:buSzPct val="130000"/>
               <a:buFont typeface="Arial" panose="020B0604020202020204" pitchFamily="34" charset="0"/>
               <a:buChar char="•"/>
             </a:pPr>
@@ -3612,6 +3628,10 @@
           </a:p>
           <a:p>
             <a:pPr marL="171450" indent="-171450">
+              <a:buClr>
+                <a:schemeClr val="accent1"/>
+              </a:buClr>
+              <a:buSzPct val="130000"/>
               <a:buFont typeface="Arial" panose="020B0604020202020204" pitchFamily="34" charset="0"/>
               <a:buChar char="•"/>
             </a:pPr>
@@ -3622,6 +3642,10 @@
           </a:p>
           <a:p>
             <a:pPr marL="171450" indent="-171450">
+              <a:buClr>
+                <a:schemeClr val="accent1"/>
+              </a:buClr>
+              <a:buSzPct val="130000"/>
               <a:buFont typeface="Arial" panose="020B0604020202020204" pitchFamily="34" charset="0"/>
               <a:buChar char="•"/>
             </a:pPr>
@@ -3632,6 +3656,10 @@
           </a:p>
           <a:p>
             <a:pPr marL="171450" indent="-171450">
+              <a:buClr>
+                <a:schemeClr val="accent1"/>
+              </a:buClr>
+              <a:buSzPct val="130000"/>
               <a:buFont typeface="Arial" panose="020B0604020202020204" pitchFamily="34" charset="0"/>
               <a:buChar char="•"/>
             </a:pPr>
@@ -3641,9 +3669,12 @@
             </a:r>
           </a:p>
           <a:p>
-            <a:pPr marL="628650" lvl="1" indent="-171450">
-              <a:buFont typeface="Arial" panose="020B0604020202020204" pitchFamily="34" charset="0"/>
-              <a:buChar char="•"/>
+            <a:pPr marL="800100" lvl="1" indent="-342900">
+              <a:buClr>
+                <a:schemeClr val="accent1"/>
+              </a:buClr>
+              <a:buFont typeface="Wingdings" panose="05000000000000000000" pitchFamily="2" charset="2"/>
+              <a:buChar char="ü"/>
             </a:pPr>
             <a:r>
               <a:rPr lang="en-US" sz="2000" dirty="0"/>
@@ -3651,9 +3682,12 @@
             </a:r>
           </a:p>
           <a:p>
-            <a:pPr marL="628650" lvl="1" indent="-171450">
-              <a:buFont typeface="Arial" panose="020B0604020202020204" pitchFamily="34" charset="0"/>
-              <a:buChar char="•"/>
+            <a:pPr marL="800100" lvl="1" indent="-342900">
+              <a:buClr>
+                <a:schemeClr val="accent1"/>
+              </a:buClr>
+              <a:buFont typeface="Wingdings" panose="05000000000000000000" pitchFamily="2" charset="2"/>
+              <a:buChar char="ü"/>
             </a:pPr>
             <a:r>
               <a:rPr lang="en-US" sz="2000" dirty="0" err="1"/>
@@ -3662,9 +3696,12 @@
             <a:endParaRPr lang="en-US" sz="2000" dirty="0"/>
           </a:p>
           <a:p>
-            <a:pPr marL="628650" lvl="1" indent="-171450">
-              <a:buFont typeface="Arial" panose="020B0604020202020204" pitchFamily="34" charset="0"/>
-              <a:buChar char="•"/>
+            <a:pPr marL="800100" lvl="1" indent="-342900">
+              <a:buClr>
+                <a:schemeClr val="accent1"/>
+              </a:buClr>
+              <a:buFont typeface="Wingdings" panose="05000000000000000000" pitchFamily="2" charset="2"/>
+              <a:buChar char="ü"/>
             </a:pPr>
             <a:r>
               <a:rPr lang="en-US" sz="2000" dirty="0"/>
@@ -3672,9 +3709,12 @@
             </a:r>
           </a:p>
           <a:p>
-            <a:pPr marL="628650" lvl="1" indent="-171450">
-              <a:buFont typeface="Arial" panose="020B0604020202020204" pitchFamily="34" charset="0"/>
-              <a:buChar char="•"/>
+            <a:pPr marL="800100" lvl="1" indent="-342900">
+              <a:buClr>
+                <a:schemeClr val="accent1"/>
+              </a:buClr>
+              <a:buFont typeface="Wingdings" panose="05000000000000000000" pitchFamily="2" charset="2"/>
+              <a:buChar char="ü"/>
             </a:pPr>
             <a:r>
               <a:rPr lang="en-US" sz="2000" dirty="0"/>

</xml_diff>